<commit_message>
Updated slides slightly to improve clarity.
</commit_message>
<xml_diff>
--- a/Rest API - Intro.pptx
+++ b/Rest API - Intro.pptx
@@ -3929,6 +3929,40 @@
               <a:t>Update an employee</a:t>
             </a:r>
           </a:p>
+          <a:p>
+            <a:pPr/>
+            <a:r>
+              <a:t>Includes a body with the object and properties:</a:t>
+            </a:r>
+          </a:p>
+          <a:p>
+            <a:pPr/>
+            <a:r>
+              <a:t>Example:</a:t>
+            </a:r>
+          </a:p>
+          <a:p>
+            <a:pPr lvl="1"/>
+            <a:r>
+              <a:t>{</a:t>
+            </a:r>
+            <a:br/>
+            <a:r>
+              <a:t>“id”: 52,</a:t>
+            </a:r>
+            <a:br/>
+            <a:r>
+              <a:t>“name”: “Fred Anderson”,</a:t>
+            </a:r>
+            <a:br/>
+            <a:r>
+              <a:t>“title”: “Manager”</a:t>
+            </a:r>
+            <a:br/>
+            <a:r>
+              <a:t>}</a:t>
+            </a:r>
+          </a:p>
         </p:txBody>
       </p:sp>
     </p:spTree>
@@ -4051,6 +4085,12 @@
             <a:pPr lvl="1"/>
             <a:r>
               <a:t>Delete an employee</a:t>
+            </a:r>
+          </a:p>
+          <a:p>
+            <a:pPr/>
+            <a:r>
+              <a:t>No body expected</a:t>
             </a:r>
           </a:p>
         </p:txBody>
@@ -6106,7 +6146,7 @@
           <a:p>
             <a:pPr/>
             <a:r>
-              <a:t>Object State Fully Represented</a:t>
+              <a:t>Object Properties and Values</a:t>
             </a:r>
           </a:p>
           <a:p>
@@ -7088,7 +7128,7 @@
       </p:sp>
       <p:sp>
         <p:nvSpPr>
-          <p:cNvPr id="152" name="Nouns exist in URI…"/>
+          <p:cNvPr id="152" name="Nouns exist in URL…"/>
           <p:cNvSpPr txBox="1"/>
           <p:nvPr>
             <p:ph type="body" idx="1"/>
@@ -7105,13 +7145,13 @@
           <a:p>
             <a:pPr/>
             <a:r>
-              <a:t>Nouns exist in URI</a:t>
+              <a:t>Nouns exist in URL</a:t>
             </a:r>
           </a:p>
           <a:p>
             <a:pPr/>
             <a:r>
-              <a:t>Example URI:</a:t>
+              <a:t>Example URL:</a:t>
             </a:r>
           </a:p>
           <a:p>
@@ -7786,10 +7826,6 @@
           </a:stretch>
         </p:blipFill>
         <p:spPr>
-          <a:xfrm>
-            <a:off x="0" y="0"/>
-            <a:ext cx="12065000" cy="13716000"/>
-          </a:xfrm>
           <a:prstGeom prst="rect">
             <a:avLst/>
           </a:prstGeom>
@@ -7834,7 +7870,7 @@
         </p:nvGraphicFramePr>
         <p:xfrm>
           <a:off x="12700000" y="3175000"/>
-          <a:ext cx="11176001" cy="10160001"/>
+          <a:ext cx="11176000" cy="10160000"/>
         </p:xfrm>
         <a:graphic xmlns:a="http://schemas.openxmlformats.org/drawingml/2006/main">
           <a:graphicData uri="http://schemas.openxmlformats.org/drawingml/2006/table">
@@ -8667,6 +8703,40 @@
               <a:t>Insert an employee</a:t>
             </a:r>
           </a:p>
+          <a:p>
+            <a:pPr/>
+            <a:r>
+              <a:t>Includes a body with the object and properties:</a:t>
+            </a:r>
+          </a:p>
+          <a:p>
+            <a:pPr/>
+            <a:r>
+              <a:t>Example:</a:t>
+            </a:r>
+          </a:p>
+          <a:p>
+            <a:pPr lvl="1"/>
+            <a:r>
+              <a:t>{</a:t>
+            </a:r>
+            <a:br/>
+            <a:r>
+              <a:t>“id”: 52,</a:t>
+            </a:r>
+            <a:br/>
+            <a:r>
+              <a:t>“name”: “Fred Anderson”,</a:t>
+            </a:r>
+            <a:br/>
+            <a:r>
+              <a:t>“title”: “Manager”</a:t>
+            </a:r>
+            <a:br/>
+            <a:r>
+              <a:t>}</a:t>
+            </a:r>
+          </a:p>
         </p:txBody>
       </p:sp>
     </p:spTree>

</xml_diff>